<commit_message>
Updating all builds excluding backup
</commit_message>
<xml_diff>
--- a/Hill Cipher with Key Gen.pptx
+++ b/Hill Cipher with Key Gen.pptx
@@ -199,6 +199,96 @@
 </inkml:ink>
 </file>
 
+<file path=ppt/ink/ink3.xml><?xml version="1.0" encoding="utf-8"?>
+<inkml:ink xmlns:inkml="http://www.w3.org/2003/InkML">
+  <inkml:definitions>
+    <inkml:context xml:id="ctx0">
+      <inkml:inkSource xml:id="inkSrc0">
+        <inkml:traceFormat>
+          <inkml:channel name="X" type="integer" max="3840" units="cm"/>
+          <inkml:channel name="Y" type="integer" max="1080" units="cm"/>
+          <inkml:channel name="T" type="integer" max="2.14748E9" units="dev"/>
+        </inkml:traceFormat>
+        <inkml:channelProperties>
+          <inkml:channelProperty channel="X" name="resolution" value="75.44204" units="1/cm"/>
+          <inkml:channelProperty channel="Y" name="resolution" value="37.76224" units="1/cm"/>
+          <inkml:channelProperty channel="T" name="resolution" value="1" units="1/dev"/>
+        </inkml:channelProperties>
+      </inkml:inkSource>
+      <inkml:timestamp xml:id="ts0" timeString="2021-03-09T22:11:11.456"/>
+    </inkml:context>
+    <inkml:brush xml:id="br0">
+      <inkml:brushProperty name="width" value="0.08819" units="cm"/>
+      <inkml:brushProperty name="height" value="0.35278" units="cm"/>
+      <inkml:brushProperty name="color" value="#FFFF00"/>
+      <inkml:brushProperty name="tip" value="rectangle"/>
+      <inkml:brushProperty name="rasterOp" value="maskPen"/>
+    </inkml:brush>
+  </inkml:definitions>
+  <inkml:trace contextRef="#ctx0" brushRef="#br0">5500 12933 0,'-28'0'141,"0"0"-125,0 0-1,1 0-15,-1 0 16,28-28-16,-28 28 16,0 0-1,0 0 1,0 0-16,0 0 31,0 0 0,0 0-15,0 0 0,0 0 15,0 0 0,0 0 0,1 0-31,-1 0 16,0 0 0,0 0-1,0 0 16,0 0-15,0 0 15,0 0-15,0 0 0,0 0-16,0 0 15,0 0 16,1 0-15,-1 0 0,0 0-16,28 28 15,-28-28-15,0 0 32,0 0-32,0 0 15,0 0 1,0 0 15,0 0-31,0 0 31,0 0-31,0 0 16,28 28-16,-27-28 16,-1 0-1,0 0 1,0 0-1,0 0-15,0 0 16,0 0 0,0 0-1,0 0-15,28 28 0,-28-28 16,0 0 15,0 0-15,1 0-1,-1 0-15,0 0 16,0 0 0,0 0-1,0 0 1,0 0 0,0 0-1,0 0 16,0 0-31,0 0 16,0 0 15,0 0-15,1 0 0,-1 0-1,0 0 1,0 0-1,0 0 1,0 0 0,0 0-1,0 0 17,0 0-32,0 0 15,0 0 1,0 0-1,1 0-15,-1 0 32,0 0-17,0 0 1,0 0 0,0 0-1,0 0 1,0 0-1,0 0 1,0 0 15,0 0-15,0 0 0,-27 0 30,82 0 173,141 0-172,-140 0-47,0 0 16,0 0-16,0 0 15,0 0 1,0 0 0,-1 0-1,-27 27 1,28-27-16,0 0 15,0 0 17,0 0-32,0 0 15,0 0 1,0 0 0,0 0-16,0 0 15,0 0-15,0 0 16,-1 0-16,1 0 0,0 0 15,0 0-15,0 0 16,0 0-16,0 0 16,0 0-16,0 0 15,0 0-15,0 0 0,0 0 16,0 0-16,-1 0 16,1 0-16,0 0 15,-28-27-15,28 27 0,0 0 16,0 0-16,0 0 15,-28-28-15,28 28 0,0 0 0,0 0 16,0 0-16,0 0 16,-1 0-16,1 0 15,0 0-15,0 0 16,0-28-16,0 28 0,0 0 16,0 0-16,0 0 15,0 0-15,0 0 16,0 0-16,0-28 0,-1 28 15,1 0-15,0 0 16,0 0-16,0 0 16,0 0-16,0 0 15,0 0-15,0 0 16,0 0 0,0 0-1,0 0 1,-1 0-16,1 0 15,0 0 1,0 0 0,0 0-1,0 0 1,0 0 15,0 0 0,0 0-15,0 0 0,0 0 15,0 0 47,0 0-62,-1 0 156</inkml:trace>
+</inkml:ink>
+</file>
+
+<file path=ppt/ink/ink4.xml><?xml version="1.0" encoding="utf-8"?>
+<inkml:ink xmlns:inkml="http://www.w3.org/2003/InkML">
+  <inkml:definitions>
+    <inkml:context xml:id="ctx0">
+      <inkml:inkSource xml:id="inkSrc0">
+        <inkml:traceFormat>
+          <inkml:channel name="X" type="integer" max="3840" units="cm"/>
+          <inkml:channel name="Y" type="integer" max="1080" units="cm"/>
+          <inkml:channel name="T" type="integer" max="2.14748E9" units="dev"/>
+        </inkml:traceFormat>
+        <inkml:channelProperties>
+          <inkml:channelProperty channel="X" name="resolution" value="75.44204" units="1/cm"/>
+          <inkml:channelProperty channel="Y" name="resolution" value="37.76224" units="1/cm"/>
+          <inkml:channelProperty channel="T" name="resolution" value="1" units="1/dev"/>
+        </inkml:channelProperties>
+      </inkml:inkSource>
+      <inkml:timestamp xml:id="ts0" timeString="2021-03-09T22:11:15.496"/>
+    </inkml:context>
+    <inkml:brush xml:id="br0">
+      <inkml:brushProperty name="width" value="0.08819" units="cm"/>
+      <inkml:brushProperty name="height" value="0.35278" units="cm"/>
+      <inkml:brushProperty name="color" value="#FFFF00"/>
+      <inkml:brushProperty name="tip" value="rectangle"/>
+      <inkml:brushProperty name="rasterOp" value="maskPen"/>
+    </inkml:brush>
+  </inkml:definitions>
+  <inkml:trace contextRef="#ctx0" brushRef="#br0">5109 12989 0,'-28'0'94,"0"0"-94,28-28 16,-27 28-16,-1 0 15,0 0-15,0 0 16,0 0 0,0 0-1,0 0 1,0 0-1,0 0 17,0 0-1,0 0 0,0 0-15,1 0 31,-1 0-16,0 0-15,0 0-1,0 0 16,0 0-15,0 0-16,28-28 16,-28 28-16,0 0 15,0 0 17,0 0-32,0 0 31,0 0-16,1 0 17,54 0 249,1 0-265,0 0-16,0 0 15,0 0-15,0 0 16,0 0-1,0 0 1,0 0-16,0 0 16,0 0-1,0 0-15,0 0 16,-1 0 0,1 0-1,0 0-15,0 0 16,0 0-1,-28 28-15,28-28 16,0 0 0,0 0-1,0 0 17,0 0-17,0 0 1,0 0 31,-1 0-32,1 0 17,-28 28-17,28-28 1,0 0 62,0 0-31,0 0-16,0 0-15,0 0-1,0 0 79,0 0-78,0 0-1,0 0-15,0 0 32</inkml:trace>
+</inkml:ink>
+</file>
+
+<file path=ppt/ink/ink5.xml><?xml version="1.0" encoding="utf-8"?>
+<inkml:ink xmlns:inkml="http://www.w3.org/2003/InkML">
+  <inkml:definitions>
+    <inkml:context xml:id="ctx0">
+      <inkml:inkSource xml:id="inkSrc0">
+        <inkml:traceFormat>
+          <inkml:channel name="X" type="integer" max="3840" units="cm"/>
+          <inkml:channel name="Y" type="integer" max="1080" units="cm"/>
+          <inkml:channel name="T" type="integer" max="2.14748E9" units="dev"/>
+        </inkml:traceFormat>
+        <inkml:channelProperties>
+          <inkml:channelProperty channel="X" name="resolution" value="75.44204" units="1/cm"/>
+          <inkml:channelProperty channel="Y" name="resolution" value="37.76224" units="1/cm"/>
+          <inkml:channelProperty channel="T" name="resolution" value="1" units="1/dev"/>
+        </inkml:channelProperties>
+      </inkml:inkSource>
+      <inkml:timestamp xml:id="ts0" timeString="2021-03-09T22:12:24.738"/>
+    </inkml:context>
+    <inkml:brush xml:id="br0">
+      <inkml:brushProperty name="width" value="0.08819" units="cm"/>
+      <inkml:brushProperty name="height" value="0.35278" units="cm"/>
+      <inkml:brushProperty name="color" value="#FFFF00"/>
+      <inkml:brushProperty name="tip" value="rectangle"/>
+      <inkml:brushProperty name="rasterOp" value="maskPen"/>
+    </inkml:brush>
+  </inkml:definitions>
+  <inkml:trace contextRef="#ctx0" brushRef="#br0">20381 15810 0,'-27'0'140,"-1"0"-77,0 0-1,0 0-30,0 0-17,0 0 16,0 0 1,0 0-1,0 0-15,0 0 15,0 0-16,0 0 32,0 0-31,28-28 0,-27 28-1,-1 0 16,0 0 16,0 0-31,0 0 15,0 0-15,0 0 15,0 0 0,0 0-15,0 0 0,0 0-1,0 0 1,1 0-16,-1 0 15,0 0 17,0 0-17,0 0 1,0 0-16,0 0 31,0 0-15,0 0-16,0 0 15,0 0 1,0 0 0,0 0-16,1 0 15,-1 0 1,0 0-16,0 0 16,0 0-1,0 0-15,0 0 16,0 0-16,0 0 15,0 0 1,0 0 0,0 0-16,1 0 15,-1 0 1,0 0-16,0 0 16,0 0-1,0 0-15,0 0 16,0 0-1,0 0 1,0 0-16,0 0 16,0 0-1,0 0-15,1 0 16,27 28-16,-28-28 16,0 0 15,0 0-31,0 0 31,0 0 0,0 0 16,0 0-16,0 0 1,0 28-1,0-28 0,0 0-15,1 0 203,-1 0-110,0 0 297,0 0-406,0 0 172</inkml:trace>
+</inkml:ink>
+</file>
+
 <file path=ppt/notesMasters/notesMaster1.xml><?xml version="1.0" encoding="utf-8"?>
 <p:notesMaster xmlns:a="http://schemas.openxmlformats.org/drawingml/2006/main" xmlns:r="http://schemas.openxmlformats.org/officeDocument/2006/relationships" xmlns:p="http://schemas.openxmlformats.org/presentationml/2006/main">
   <p:cSld>
@@ -593,14 +683,25 @@
           <a:lstStyle/>
           <a:p>
             <a:r>
-              <a:rPr lang="en-US" dirty="0"/>
-              <a:t>Confusion = mask relationship between ciphertext and Key</a:t>
-            </a:r>
-          </a:p>
-          <a:p>
-            <a:r>
-              <a:rPr lang="en-US" dirty="0"/>
-              <a:t>Diffusion = mask relationship between ciphertext and plaintext</a:t>
+              <a:rPr lang="en-US" sz="1200" dirty="0"/>
+              <a:t>Mention that d^-1 is the extended </a:t>
+            </a:r>
+            <a:r>
+              <a:rPr lang="en-US" sz="1200" dirty="0" err="1"/>
+              <a:t>gcd</a:t>
+            </a:r>
+            <a:r>
+              <a:rPr lang="en-US" sz="1200" dirty="0"/>
+              <a:t> of d and the modulo</a:t>
+            </a:r>
+          </a:p>
+          <a:p>
+            <a:endParaRPr lang="en-US" sz="1200" dirty="0"/>
+          </a:p>
+          <a:p>
+            <a:r>
+              <a:rPr lang="en-US" sz="1200" dirty="0"/>
+              <a:t>Ambiguous meaning that when attempting to encrypt or decrypt, multiple answers can be true, and the program wont be able to decide which is the right answer</a:t>
             </a:r>
           </a:p>
         </p:txBody>
@@ -622,7 +723,7 @@
           <a:p>
             <a:fld id="{B44966F2-10BF-4099-A8EC-C00752F4607E}" type="slidenum">
               <a:rPr lang="en-US" smtClean="0"/>
-              <a:t>7</a:t>
+              <a:t>4</a:t>
             </a:fld>
             <a:endParaRPr lang="en-US"/>
           </a:p>
@@ -631,7 +732,7 @@
     </p:spTree>
     <p:extLst>
       <p:ext uri="{BB962C8B-B14F-4D97-AF65-F5344CB8AC3E}">
-        <p14:creationId xmlns:p14="http://schemas.microsoft.com/office/powerpoint/2010/main" val="2821800533"/>
+        <p14:creationId xmlns:p14="http://schemas.microsoft.com/office/powerpoint/2010/main" val="1308240335"/>
       </p:ext>
     </p:extLst>
   </p:cSld>
@@ -685,6 +786,186 @@
           <a:bodyPr/>
           <a:lstStyle/>
           <a:p>
+            <a:r>
+              <a:rPr lang="en-US" dirty="0"/>
+              <a:t>AT END, TRANSITION TO Alex SPEAKING --- “Turning it over to Alex for the latter half”</a:t>
+            </a:r>
+          </a:p>
+        </p:txBody>
+      </p:sp>
+      <p:sp>
+        <p:nvSpPr>
+          <p:cNvPr id="4" name="Slide Number Placeholder 3"/>
+          <p:cNvSpPr>
+            <a:spLocks noGrp="1"/>
+          </p:cNvSpPr>
+          <p:nvPr>
+            <p:ph type="sldNum" sz="quarter" idx="5"/>
+          </p:nvPr>
+        </p:nvSpPr>
+        <p:spPr/>
+        <p:txBody>
+          <a:bodyPr/>
+          <a:lstStyle/>
+          <a:p>
+            <a:fld id="{B44966F2-10BF-4099-A8EC-C00752F4607E}" type="slidenum">
+              <a:rPr lang="en-US" smtClean="0"/>
+              <a:t>5</a:t>
+            </a:fld>
+            <a:endParaRPr lang="en-US"/>
+          </a:p>
+        </p:txBody>
+      </p:sp>
+    </p:spTree>
+    <p:extLst>
+      <p:ext uri="{BB962C8B-B14F-4D97-AF65-F5344CB8AC3E}">
+        <p14:creationId xmlns:p14="http://schemas.microsoft.com/office/powerpoint/2010/main" val="2698703105"/>
+      </p:ext>
+    </p:extLst>
+  </p:cSld>
+  <p:clrMapOvr>
+    <a:masterClrMapping/>
+  </p:clrMapOvr>
+</p:notes>
+</file>
+
+<file path=ppt/notesSlides/notesSlide3.xml><?xml version="1.0" encoding="utf-8"?>
+<p:notes xmlns:a="http://schemas.openxmlformats.org/drawingml/2006/main" xmlns:r="http://schemas.openxmlformats.org/officeDocument/2006/relationships" xmlns:p="http://schemas.openxmlformats.org/presentationml/2006/main">
+  <p:cSld>
+    <p:spTree>
+      <p:nvGrpSpPr>
+        <p:cNvPr id="1" name=""/>
+        <p:cNvGrpSpPr/>
+        <p:nvPr/>
+      </p:nvGrpSpPr>
+      <p:grpSpPr>
+        <a:xfrm>
+          <a:off x="0" y="0"/>
+          <a:ext cx="0" cy="0"/>
+          <a:chOff x="0" y="0"/>
+          <a:chExt cx="0" cy="0"/>
+        </a:xfrm>
+      </p:grpSpPr>
+      <p:sp>
+        <p:nvSpPr>
+          <p:cNvPr id="2" name="Slide Image Placeholder 1"/>
+          <p:cNvSpPr>
+            <a:spLocks noGrp="1" noRot="1" noChangeAspect="1"/>
+          </p:cNvSpPr>
+          <p:nvPr>
+            <p:ph type="sldImg"/>
+          </p:nvPr>
+        </p:nvSpPr>
+        <p:spPr/>
+      </p:sp>
+      <p:sp>
+        <p:nvSpPr>
+          <p:cNvPr id="3" name="Notes Placeholder 2"/>
+          <p:cNvSpPr>
+            <a:spLocks noGrp="1"/>
+          </p:cNvSpPr>
+          <p:nvPr>
+            <p:ph type="body" idx="1"/>
+          </p:nvPr>
+        </p:nvSpPr>
+        <p:spPr/>
+        <p:txBody>
+          <a:bodyPr/>
+          <a:lstStyle/>
+          <a:p>
+            <a:r>
+              <a:rPr lang="en-US" dirty="0"/>
+              <a:t>Confusion = mask relationship between ciphertext and Key</a:t>
+            </a:r>
+          </a:p>
+          <a:p>
+            <a:r>
+              <a:rPr lang="en-US" dirty="0"/>
+              <a:t>Diffusion = mask relationship between ciphertext and plaintext</a:t>
+            </a:r>
+          </a:p>
+        </p:txBody>
+      </p:sp>
+      <p:sp>
+        <p:nvSpPr>
+          <p:cNvPr id="4" name="Slide Number Placeholder 3"/>
+          <p:cNvSpPr>
+            <a:spLocks noGrp="1"/>
+          </p:cNvSpPr>
+          <p:nvPr>
+            <p:ph type="sldNum" sz="quarter" idx="5"/>
+          </p:nvPr>
+        </p:nvSpPr>
+        <p:spPr/>
+        <p:txBody>
+          <a:bodyPr/>
+          <a:lstStyle/>
+          <a:p>
+            <a:fld id="{B44966F2-10BF-4099-A8EC-C00752F4607E}" type="slidenum">
+              <a:rPr lang="en-US" smtClean="0"/>
+              <a:t>7</a:t>
+            </a:fld>
+            <a:endParaRPr lang="en-US"/>
+          </a:p>
+        </p:txBody>
+      </p:sp>
+    </p:spTree>
+    <p:extLst>
+      <p:ext uri="{BB962C8B-B14F-4D97-AF65-F5344CB8AC3E}">
+        <p14:creationId xmlns:p14="http://schemas.microsoft.com/office/powerpoint/2010/main" val="2821800533"/>
+      </p:ext>
+    </p:extLst>
+  </p:cSld>
+  <p:clrMapOvr>
+    <a:masterClrMapping/>
+  </p:clrMapOvr>
+</p:notes>
+</file>
+
+<file path=ppt/notesSlides/notesSlide4.xml><?xml version="1.0" encoding="utf-8"?>
+<p:notes xmlns:a="http://schemas.openxmlformats.org/drawingml/2006/main" xmlns:r="http://schemas.openxmlformats.org/officeDocument/2006/relationships" xmlns:p="http://schemas.openxmlformats.org/presentationml/2006/main">
+  <p:cSld>
+    <p:spTree>
+      <p:nvGrpSpPr>
+        <p:cNvPr id="1" name=""/>
+        <p:cNvGrpSpPr/>
+        <p:nvPr/>
+      </p:nvGrpSpPr>
+      <p:grpSpPr>
+        <a:xfrm>
+          <a:off x="0" y="0"/>
+          <a:ext cx="0" cy="0"/>
+          <a:chOff x="0" y="0"/>
+          <a:chExt cx="0" cy="0"/>
+        </a:xfrm>
+      </p:grpSpPr>
+      <p:sp>
+        <p:nvSpPr>
+          <p:cNvPr id="2" name="Slide Image Placeholder 1"/>
+          <p:cNvSpPr>
+            <a:spLocks noGrp="1" noRot="1" noChangeAspect="1"/>
+          </p:cNvSpPr>
+          <p:nvPr>
+            <p:ph type="sldImg"/>
+          </p:nvPr>
+        </p:nvSpPr>
+        <p:spPr/>
+      </p:sp>
+      <p:sp>
+        <p:nvSpPr>
+          <p:cNvPr id="3" name="Notes Placeholder 2"/>
+          <p:cNvSpPr>
+            <a:spLocks noGrp="1"/>
+          </p:cNvSpPr>
+          <p:nvPr>
+            <p:ph type="body" idx="1"/>
+          </p:nvPr>
+        </p:nvSpPr>
+        <p:spPr/>
+        <p:txBody>
+          <a:bodyPr/>
+          <a:lstStyle/>
+          <a:p>
             <a:pPr marL="0" marR="0" lvl="0" indent="0" algn="l" defTabSz="914400" rtl="0" eaLnBrk="1" fontAlgn="auto" latinLnBrk="0" hangingPunct="1">
               <a:lnSpc>
                 <a:spcPct val="100000"/>
@@ -733,6 +1014,90 @@
     <p:extLst>
       <p:ext uri="{BB962C8B-B14F-4D97-AF65-F5344CB8AC3E}">
         <p14:creationId xmlns:p14="http://schemas.microsoft.com/office/powerpoint/2010/main" val="2870792756"/>
+      </p:ext>
+    </p:extLst>
+  </p:cSld>
+  <p:clrMapOvr>
+    <a:masterClrMapping/>
+  </p:clrMapOvr>
+</p:notes>
+</file>
+
+<file path=ppt/notesSlides/notesSlide5.xml><?xml version="1.0" encoding="utf-8"?>
+<p:notes xmlns:a="http://schemas.openxmlformats.org/drawingml/2006/main" xmlns:r="http://schemas.openxmlformats.org/officeDocument/2006/relationships" xmlns:p="http://schemas.openxmlformats.org/presentationml/2006/main">
+  <p:cSld>
+    <p:spTree>
+      <p:nvGrpSpPr>
+        <p:cNvPr id="1" name=""/>
+        <p:cNvGrpSpPr/>
+        <p:nvPr/>
+      </p:nvGrpSpPr>
+      <p:grpSpPr>
+        <a:xfrm>
+          <a:off x="0" y="0"/>
+          <a:ext cx="0" cy="0"/>
+          <a:chOff x="0" y="0"/>
+          <a:chExt cx="0" cy="0"/>
+        </a:xfrm>
+      </p:grpSpPr>
+      <p:sp>
+        <p:nvSpPr>
+          <p:cNvPr id="2" name="Slide Image Placeholder 1"/>
+          <p:cNvSpPr>
+            <a:spLocks noGrp="1" noRot="1" noChangeAspect="1"/>
+          </p:cNvSpPr>
+          <p:nvPr>
+            <p:ph type="sldImg"/>
+          </p:nvPr>
+        </p:nvSpPr>
+        <p:spPr/>
+      </p:sp>
+      <p:sp>
+        <p:nvSpPr>
+          <p:cNvPr id="3" name="Notes Placeholder 2"/>
+          <p:cNvSpPr>
+            <a:spLocks noGrp="1"/>
+          </p:cNvSpPr>
+          <p:nvPr>
+            <p:ph type="body" idx="1"/>
+          </p:nvPr>
+        </p:nvSpPr>
+        <p:spPr/>
+        <p:txBody>
+          <a:bodyPr/>
+          <a:lstStyle/>
+          <a:p>
+            <a:endParaRPr lang="en-US" dirty="0"/>
+          </a:p>
+        </p:txBody>
+      </p:sp>
+      <p:sp>
+        <p:nvSpPr>
+          <p:cNvPr id="4" name="Slide Number Placeholder 3"/>
+          <p:cNvSpPr>
+            <a:spLocks noGrp="1"/>
+          </p:cNvSpPr>
+          <p:nvPr>
+            <p:ph type="sldNum" sz="quarter" idx="5"/>
+          </p:nvPr>
+        </p:nvSpPr>
+        <p:spPr/>
+        <p:txBody>
+          <a:bodyPr/>
+          <a:lstStyle/>
+          <a:p>
+            <a:fld id="{B44966F2-10BF-4099-A8EC-C00752F4607E}" type="slidenum">
+              <a:rPr lang="en-US" smtClean="0"/>
+              <a:t>9</a:t>
+            </a:fld>
+            <a:endParaRPr lang="en-US"/>
+          </a:p>
+        </p:txBody>
+      </p:sp>
+    </p:spTree>
+    <p:extLst>
+      <p:ext uri="{BB962C8B-B14F-4D97-AF65-F5344CB8AC3E}">
+        <p14:creationId xmlns:p14="http://schemas.microsoft.com/office/powerpoint/2010/main" val="2133633602"/>
       </p:ext>
     </p:extLst>
   </p:cSld>
@@ -7038,6 +7403,159 @@
           </a:effectLst>
         </p:spPr>
       </p:pic>
+      <mc:AlternateContent xmlns:mc="http://schemas.openxmlformats.org/markup-compatibility/2006">
+        <mc:Choice xmlns:p14="http://schemas.microsoft.com/office/powerpoint/2010/main" Requires="p14">
+          <p:contentPart p14:bwMode="auto" r:id="rId4">
+            <p14:nvContentPartPr>
+              <p14:cNvPr id="6" name="Ink 5">
+                <a:extLst>
+                  <a:ext uri="{FF2B5EF4-FFF2-40B4-BE49-F238E27FC236}">
+                    <a16:creationId xmlns:a16="http://schemas.microsoft.com/office/drawing/2014/main" id="{EC763525-EFAD-4C46-BF56-46356C86EE00}"/>
+                  </a:ext>
+                </a:extLst>
+              </p14:cNvPr>
+              <p14:cNvContentPartPr/>
+              <p14:nvPr/>
+            </p14:nvContentPartPr>
+            <p14:xfrm>
+              <a:off x="1055520" y="4645800"/>
+              <a:ext cx="924840" cy="40320"/>
+            </p14:xfrm>
+          </p:contentPart>
+        </mc:Choice>
+        <mc:Fallback>
+          <p:pic>
+            <p:nvPicPr>
+              <p:cNvPr id="6" name="Ink 5">
+                <a:extLst>
+                  <a:ext uri="{FF2B5EF4-FFF2-40B4-BE49-F238E27FC236}">
+                    <a16:creationId xmlns:a16="http://schemas.microsoft.com/office/drawing/2014/main" id="{EC763525-EFAD-4C46-BF56-46356C86EE00}"/>
+                  </a:ext>
+                </a:extLst>
+              </p:cNvPr>
+              <p:cNvPicPr/>
+              <p:nvPr/>
+            </p:nvPicPr>
+            <p:blipFill>
+              <a:blip r:embed="rId5"/>
+              <a:stretch>
+                <a:fillRect/>
+              </a:stretch>
+            </p:blipFill>
+            <p:spPr>
+              <a:xfrm>
+                <a:off x="1039680" y="4582440"/>
+                <a:ext cx="956160" cy="167040"/>
+              </a:xfrm>
+              <a:prstGeom prst="rect">
+                <a:avLst/>
+              </a:prstGeom>
+            </p:spPr>
+          </p:pic>
+        </mc:Fallback>
+      </mc:AlternateContent>
+      <mc:AlternateContent xmlns:mc="http://schemas.openxmlformats.org/markup-compatibility/2006">
+        <mc:Choice xmlns:p14="http://schemas.microsoft.com/office/powerpoint/2010/main" Requires="p14">
+          <p:contentPart p14:bwMode="auto" r:id="rId6">
+            <p14:nvContentPartPr>
+              <p14:cNvPr id="7" name="Ink 6">
+                <a:extLst>
+                  <a:ext uri="{FF2B5EF4-FFF2-40B4-BE49-F238E27FC236}">
+                    <a16:creationId xmlns:a16="http://schemas.microsoft.com/office/drawing/2014/main" id="{630260F4-21EC-443D-990C-13469A26C057}"/>
+                  </a:ext>
+                </a:extLst>
+              </p14:cNvPr>
+              <p14:cNvContentPartPr/>
+              <p14:nvPr/>
+            </p14:nvContentPartPr>
+            <p14:xfrm>
+              <a:off x="1558080" y="4655880"/>
+              <a:ext cx="382320" cy="20520"/>
+            </p14:xfrm>
+          </p:contentPart>
+        </mc:Choice>
+        <mc:Fallback>
+          <p:pic>
+            <p:nvPicPr>
+              <p:cNvPr id="7" name="Ink 6">
+                <a:extLst>
+                  <a:ext uri="{FF2B5EF4-FFF2-40B4-BE49-F238E27FC236}">
+                    <a16:creationId xmlns:a16="http://schemas.microsoft.com/office/drawing/2014/main" id="{630260F4-21EC-443D-990C-13469A26C057}"/>
+                  </a:ext>
+                </a:extLst>
+              </p:cNvPr>
+              <p:cNvPicPr/>
+              <p:nvPr/>
+            </p:nvPicPr>
+            <p:blipFill>
+              <a:blip r:embed="rId7"/>
+              <a:stretch>
+                <a:fillRect/>
+              </a:stretch>
+            </p:blipFill>
+            <p:spPr>
+              <a:xfrm>
+                <a:off x="1542240" y="4592520"/>
+                <a:ext cx="413640" cy="147240"/>
+              </a:xfrm>
+              <a:prstGeom prst="rect">
+                <a:avLst/>
+              </a:prstGeom>
+            </p:spPr>
+          </p:pic>
+        </mc:Fallback>
+      </mc:AlternateContent>
+      <mc:AlternateContent xmlns:mc="http://schemas.openxmlformats.org/markup-compatibility/2006">
+        <mc:Choice xmlns:p14="http://schemas.microsoft.com/office/powerpoint/2010/main" Requires="p14">
+          <p:contentPart p14:bwMode="auto" r:id="rId8">
+            <p14:nvContentPartPr>
+              <p14:cNvPr id="8" name="Ink 7">
+                <a:extLst>
+                  <a:ext uri="{FF2B5EF4-FFF2-40B4-BE49-F238E27FC236}">
+                    <a16:creationId xmlns:a16="http://schemas.microsoft.com/office/drawing/2014/main" id="{1284DEEB-12C0-4700-A900-7D5813C216FE}"/>
+                  </a:ext>
+                </a:extLst>
+              </p14:cNvPr>
+              <p14:cNvContentPartPr/>
+              <p14:nvPr/>
+            </p14:nvContentPartPr>
+            <p14:xfrm>
+              <a:off x="6533280" y="5681520"/>
+              <a:ext cx="804240" cy="20520"/>
+            </p14:xfrm>
+          </p:contentPart>
+        </mc:Choice>
+        <mc:Fallback>
+          <p:pic>
+            <p:nvPicPr>
+              <p:cNvPr id="8" name="Ink 7">
+                <a:extLst>
+                  <a:ext uri="{FF2B5EF4-FFF2-40B4-BE49-F238E27FC236}">
+                    <a16:creationId xmlns:a16="http://schemas.microsoft.com/office/drawing/2014/main" id="{1284DEEB-12C0-4700-A900-7D5813C216FE}"/>
+                  </a:ext>
+                </a:extLst>
+              </p:cNvPr>
+              <p:cNvPicPr/>
+              <p:nvPr/>
+            </p:nvPicPr>
+            <p:blipFill>
+              <a:blip r:embed="rId9"/>
+              <a:stretch>
+                <a:fillRect/>
+              </a:stretch>
+            </p:blipFill>
+            <p:spPr>
+              <a:xfrm>
+                <a:off x="6517440" y="5618160"/>
+                <a:ext cx="835560" cy="147240"/>
+              </a:xfrm>
+              <a:prstGeom prst="rect">
+                <a:avLst/>
+              </a:prstGeom>
+            </p:spPr>
+          </p:pic>
+        </mc:Fallback>
+      </mc:AlternateContent>
     </p:spTree>
     <p:extLst>
       <p:ext uri="{BB962C8B-B14F-4D97-AF65-F5344CB8AC3E}">
@@ -7800,7 +8318,7 @@
     <p:bg>
       <p:bgPr>
         <a:blipFill rotWithShape="1">
-          <a:blip r:embed="rId2">
+          <a:blip r:embed="rId3">
             <a:duotone>
               <a:schemeClr val="bg2">
                 <a:shade val="80000"/>
@@ -7969,7 +8487,15 @@
             </a:pPr>
             <a:r>
               <a:rPr lang="en-US" sz="1600" dirty="0"/>
-              <a:t>In general, can be letters converted to numbers or plain numbers.  Ours uses 2x2 with letters.</a:t>
+              <a:t>In general, can be letters converted to numbers or plain </a:t>
+            </a:r>
+            <a:r>
+              <a:rPr lang="en-US" sz="1600"/>
+              <a:t>numbers. </a:t>
+            </a:r>
+            <a:r>
+              <a:rPr lang="en-US" sz="1600" dirty="0"/>
+              <a:t>Ours uses 2x2 with letters.</a:t>
             </a:r>
           </a:p>
           <a:p>
@@ -8090,13 +8616,13 @@
             </a:r>
             <a:r>
               <a:rPr lang="en-US" sz="1600" dirty="0" err="1">
-                <a:hlinkClick r:id="rId3"/>
+                <a:hlinkClick r:id="rId4"/>
               </a:rPr>
               <a:t>adjugate</a:t>
             </a:r>
             <a:r>
               <a:rPr lang="en-US" sz="1600" dirty="0">
-                <a:hlinkClick r:id="rId3"/>
+                <a:hlinkClick r:id="rId4"/>
               </a:rPr>
               <a:t> matrix</a:t>
             </a:r>
@@ -8233,7 +8759,7 @@
           <p:nvPr/>
         </p:nvPicPr>
         <p:blipFill>
-          <a:blip r:embed="rId4">
+          <a:blip r:embed="rId5">
             <a:extLst>
               <a:ext uri="{28A0092B-C50C-407E-A947-70E740481C1C}">
                 <a14:useLocalDpi xmlns:a14="http://schemas.microsoft.com/office/drawing/2010/main" val="0"/>
@@ -8284,7 +8810,7 @@
           <a:p>
             <a:r>
               <a:rPr lang="en-US" sz="1100" dirty="0">
-                <a:hlinkClick r:id="rId5"/>
+                <a:hlinkClick r:id="rId6"/>
               </a:rPr>
               <a:t>The most basic determinant</a:t>
             </a:r>
@@ -8307,7 +8833,7 @@
           <p:nvPr/>
         </p:nvPicPr>
         <p:blipFill>
-          <a:blip r:embed="rId6"/>
+          <a:blip r:embed="rId7"/>
           <a:stretch>
             <a:fillRect/>
           </a:stretch>
@@ -8352,19 +8878,19 @@
           <a:p>
             <a:r>
               <a:rPr lang="en-US" sz="1100" dirty="0">
-                <a:hlinkClick r:id="rId3"/>
+                <a:hlinkClick r:id="rId4"/>
               </a:rPr>
               <a:t>The most basic </a:t>
             </a:r>
             <a:r>
               <a:rPr lang="en-US" sz="1100" dirty="0" err="1">
-                <a:hlinkClick r:id="rId3"/>
+                <a:hlinkClick r:id="rId4"/>
               </a:rPr>
               <a:t>adjugate</a:t>
             </a:r>
             <a:r>
               <a:rPr lang="en-US" sz="1100" dirty="0">
-                <a:hlinkClick r:id="rId3"/>
+                <a:hlinkClick r:id="rId4"/>
               </a:rPr>
               <a:t> </a:t>
             </a:r>
@@ -8497,7 +9023,7 @@
           <p:nvPr/>
         </p:nvPicPr>
         <p:blipFill>
-          <a:blip r:embed="rId2">
+          <a:blip r:embed="rId3">
             <a:extLst>
               <a:ext uri="{28A0092B-C50C-407E-A947-70E740481C1C}">
                 <a14:useLocalDpi xmlns:a14="http://schemas.microsoft.com/office/drawing/2010/main" val="0"/>
@@ -8548,19 +9074,19 @@
           <a:p>
             <a:r>
               <a:rPr lang="en-US" sz="1100" dirty="0">
-                <a:hlinkClick r:id="rId3"/>
+                <a:hlinkClick r:id="rId4"/>
               </a:rPr>
               <a:t>Given part ‘ret’ of ‘retreat </a:t>
             </a:r>
             <a:r>
               <a:rPr lang="en-US" sz="1100" dirty="0" err="1">
-                <a:hlinkClick r:id="rId3"/>
+                <a:hlinkClick r:id="rId4"/>
               </a:rPr>
               <a:t>nowxx</a:t>
             </a:r>
             <a:r>
               <a:rPr lang="en-US" sz="1100" dirty="0">
-                <a:hlinkClick r:id="rId3"/>
+                <a:hlinkClick r:id="rId4"/>
               </a:rPr>
               <a:t>’ and the key ‘BAC/KUP/ABC’</a:t>
             </a:r>
@@ -9187,7 +9713,7 @@
           <p:nvPr/>
         </p:nvPicPr>
         <p:blipFill rotWithShape="1">
-          <a:blip r:embed="rId2">
+          <a:blip r:embed="rId3">
             <a:extLst>
               <a:ext uri="{28A0092B-C50C-407E-A947-70E740481C1C}">
                 <a14:useLocalDpi xmlns:a14="http://schemas.microsoft.com/office/drawing/2010/main" val="0"/>
@@ -9222,7 +9748,7 @@
           <p:nvPr/>
         </p:nvPicPr>
         <p:blipFill rotWithShape="1">
-          <a:blip r:embed="rId3">
+          <a:blip r:embed="rId4">
             <a:extLst>
               <a:ext uri="{28A0092B-C50C-407E-A947-70E740481C1C}">
                 <a14:useLocalDpi xmlns:a14="http://schemas.microsoft.com/office/drawing/2010/main" val="0"/>

</xml_diff>